<commit_message>
Added slides for the Vulnerabilities - Actviity Access and Intents Updated the Services presentation to add the transparent bot logo
</commit_message>
<xml_diff>
--- a/Vulnerabilities/Services/Services_Android.pptx
+++ b/Vulnerabilities/Services/Services_Android.pptx
@@ -248,7 +248,7 @@
           <a:p>
             <a:fld id="{4EA12992-B706-4D5F-A05F-EF6466B0DE69}" type="datetimeFigureOut">
               <a:rPr lang="en-US" smtClean="0"/>
-              <a:t>3/29/2017</a:t>
+              <a:t>4/13/2017</a:t>
             </a:fld>
             <a:endParaRPr lang="en-US"/>
           </a:p>
@@ -416,7 +416,7 @@
           <a:p>
             <a:fld id="{4EA12992-B706-4D5F-A05F-EF6466B0DE69}" type="datetimeFigureOut">
               <a:rPr lang="en-US" smtClean="0"/>
-              <a:t>3/29/2017</a:t>
+              <a:t>4/13/2017</a:t>
             </a:fld>
             <a:endParaRPr lang="en-US"/>
           </a:p>
@@ -594,7 +594,7 @@
           <a:p>
             <a:fld id="{4EA12992-B706-4D5F-A05F-EF6466B0DE69}" type="datetimeFigureOut">
               <a:rPr lang="en-US" smtClean="0"/>
-              <a:t>3/29/2017</a:t>
+              <a:t>4/13/2017</a:t>
             </a:fld>
             <a:endParaRPr lang="en-US"/>
           </a:p>
@@ -704,7 +704,12 @@
             <p:ph idx="1"/>
           </p:nvPr>
         </p:nvSpPr>
-        <p:spPr/>
+        <p:spPr>
+          <a:xfrm>
+            <a:off x="838200" y="1825624"/>
+            <a:ext cx="10515600" cy="4918075"/>
+          </a:xfrm>
+        </p:spPr>
         <p:txBody>
           <a:bodyPr/>
           <a:lstStyle/>
@@ -745,68 +750,78 @@
           </a:p>
         </p:txBody>
       </p:sp>
-      <p:sp>
-        <p:nvSpPr>
-          <p:cNvPr id="4" name="Date Placeholder 3"/>
-          <p:cNvSpPr>
-            <a:spLocks noGrp="1"/>
-          </p:cNvSpPr>
-          <p:nvPr>
-            <p:ph type="dt" sz="half" idx="10"/>
-          </p:nvPr>
-        </p:nvSpPr>
-        <p:spPr/>
-        <p:txBody>
-          <a:bodyPr/>
-          <a:lstStyle/>
-          <a:p>
-            <a:fld id="{4EA12992-B706-4D5F-A05F-EF6466B0DE69}" type="datetimeFigureOut">
-              <a:rPr lang="en-US" smtClean="0"/>
-              <a:t>3/29/2017</a:t>
-            </a:fld>
-            <a:endParaRPr lang="en-US"/>
-          </a:p>
-        </p:txBody>
-      </p:sp>
-      <p:sp>
-        <p:nvSpPr>
-          <p:cNvPr id="5" name="Footer Placeholder 4"/>
-          <p:cNvSpPr>
-            <a:spLocks noGrp="1"/>
-          </p:cNvSpPr>
-          <p:nvPr>
-            <p:ph type="ftr" sz="quarter" idx="11"/>
-          </p:nvPr>
-        </p:nvSpPr>
-        <p:spPr/>
-        <p:txBody>
-          <a:bodyPr/>
-          <a:lstStyle/>
-          <a:p>
-            <a:endParaRPr lang="en-US"/>
-          </a:p>
-        </p:txBody>
-      </p:sp>
-      <p:sp>
-        <p:nvSpPr>
-          <p:cNvPr id="6" name="Slide Number Placeholder 5"/>
-          <p:cNvSpPr>
-            <a:spLocks noGrp="1"/>
-          </p:cNvSpPr>
-          <p:nvPr>
-            <p:ph type="sldNum" sz="quarter" idx="12"/>
-          </p:nvPr>
-        </p:nvSpPr>
-        <p:spPr/>
-        <p:txBody>
-          <a:bodyPr/>
-          <a:lstStyle/>
-          <a:p>
-            <a:fld id="{9D0DD944-49A7-4752-BB24-5764F0D9773E}" type="slidenum">
-              <a:rPr lang="en-US" smtClean="0"/>
-              <a:t>‹#›</a:t>
-            </a:fld>
-            <a:endParaRPr lang="en-US"/>
+      <p:pic>
+        <p:nvPicPr>
+          <p:cNvPr id="7" name="Picture 6"/>
+          <p:cNvPicPr>
+            <a:picLocks noChangeAspect="1"/>
+          </p:cNvPicPr>
+          <p:nvPr userDrawn="1"/>
+        </p:nvPicPr>
+        <p:blipFill>
+          <a:blip r:embed="rId2">
+            <a:extLst>
+              <a:ext uri="{28A0092B-C50C-407E-A947-70E740481C1C}">
+                <a14:useLocalDpi xmlns:a14="http://schemas.microsoft.com/office/drawing/2010/main" val="0"/>
+              </a:ext>
+            </a:extLst>
+          </a:blip>
+          <a:stretch>
+            <a:fillRect/>
+          </a:stretch>
+        </p:blipFill>
+        <p:spPr>
+          <a:xfrm>
+            <a:off x="10845144" y="5324276"/>
+            <a:ext cx="1200318" cy="1419423"/>
+          </a:xfrm>
+          <a:prstGeom prst="rect">
+            <a:avLst/>
+          </a:prstGeom>
+        </p:spPr>
+      </p:pic>
+      <p:sp>
+        <p:nvSpPr>
+          <p:cNvPr id="8" name="TextBox 7"/>
+          <p:cNvSpPr txBox="1"/>
+          <p:nvPr userDrawn="1"/>
+        </p:nvSpPr>
+        <p:spPr>
+          <a:xfrm>
+            <a:off x="0" y="6519446"/>
+            <a:ext cx="2839916" cy="338554"/>
+          </a:xfrm>
+          <a:prstGeom prst="rect">
+            <a:avLst/>
+          </a:prstGeom>
+          <a:noFill/>
+        </p:spPr>
+        <p:txBody>
+          <a:bodyPr wrap="square" rtlCol="0">
+            <a:spAutoFit/>
+          </a:bodyPr>
+          <a:lstStyle/>
+          <a:p>
+            <a:r>
+              <a:rPr lang="en-US" sz="1600" dirty="0">
+                <a:solidFill>
+                  <a:schemeClr val="bg1">
+                    <a:lumMod val="50000"/>
+                  </a:schemeClr>
+                </a:solidFill>
+                <a:latin typeface="Cambria" panose="02040503050406030204" pitchFamily="18" charset="0"/>
+                <a:hlinkClick r:id="rId3"/>
+              </a:rPr>
+              <a:t>PLASMA Security Modules</a:t>
+            </a:r>
+            <a:endParaRPr lang="en-US" sz="1600" dirty="0">
+              <a:solidFill>
+                <a:schemeClr val="bg1">
+                  <a:lumMod val="50000"/>
+                </a:schemeClr>
+              </a:solidFill>
+              <a:latin typeface="Cambria" panose="02040503050406030204" pitchFamily="18" charset="0"/>
+            </a:endParaRPr>
           </a:p>
         </p:txBody>
       </p:sp>
@@ -1007,7 +1022,7 @@
           <a:p>
             <a:fld id="{4EA12992-B706-4D5F-A05F-EF6466B0DE69}" type="datetimeFigureOut">
               <a:rPr lang="en-US" smtClean="0"/>
-              <a:t>3/29/2017</a:t>
+              <a:t>4/13/2017</a:t>
             </a:fld>
             <a:endParaRPr lang="en-US"/>
           </a:p>
@@ -1236,7 +1251,7 @@
           <a:p>
             <a:fld id="{4EA12992-B706-4D5F-A05F-EF6466B0DE69}" type="datetimeFigureOut">
               <a:rPr lang="en-US" smtClean="0"/>
-              <a:t>3/29/2017</a:t>
+              <a:t>4/13/2017</a:t>
             </a:fld>
             <a:endParaRPr lang="en-US"/>
           </a:p>
@@ -1600,7 +1615,7 @@
           <a:p>
             <a:fld id="{4EA12992-B706-4D5F-A05F-EF6466B0DE69}" type="datetimeFigureOut">
               <a:rPr lang="en-US" smtClean="0"/>
-              <a:t>3/29/2017</a:t>
+              <a:t>4/13/2017</a:t>
             </a:fld>
             <a:endParaRPr lang="en-US"/>
           </a:p>
@@ -1717,7 +1732,7 @@
           <a:p>
             <a:fld id="{4EA12992-B706-4D5F-A05F-EF6466B0DE69}" type="datetimeFigureOut">
               <a:rPr lang="en-US" smtClean="0"/>
-              <a:t>3/29/2017</a:t>
+              <a:t>4/13/2017</a:t>
             </a:fld>
             <a:endParaRPr lang="en-US"/>
           </a:p>
@@ -1812,7 +1827,7 @@
           <a:p>
             <a:fld id="{4EA12992-B706-4D5F-A05F-EF6466B0DE69}" type="datetimeFigureOut">
               <a:rPr lang="en-US" smtClean="0"/>
-              <a:t>3/29/2017</a:t>
+              <a:t>4/13/2017</a:t>
             </a:fld>
             <a:endParaRPr lang="en-US"/>
           </a:p>
@@ -2087,7 +2102,7 @@
           <a:p>
             <a:fld id="{4EA12992-B706-4D5F-A05F-EF6466B0DE69}" type="datetimeFigureOut">
               <a:rPr lang="en-US" smtClean="0"/>
-              <a:t>3/29/2017</a:t>
+              <a:t>4/13/2017</a:t>
             </a:fld>
             <a:endParaRPr lang="en-US"/>
           </a:p>
@@ -2339,7 +2354,7 @@
           <a:p>
             <a:fld id="{4EA12992-B706-4D5F-A05F-EF6466B0DE69}" type="datetimeFigureOut">
               <a:rPr lang="en-US" smtClean="0"/>
-              <a:t>3/29/2017</a:t>
+              <a:t>4/13/2017</a:t>
             </a:fld>
             <a:endParaRPr lang="en-US"/>
           </a:p>
@@ -2550,7 +2565,7 @@
           <a:p>
             <a:fld id="{4EA12992-B706-4D5F-A05F-EF6466B0DE69}" type="datetimeFigureOut">
               <a:rPr lang="en-US" smtClean="0"/>
-              <a:t>3/29/2017</a:t>
+              <a:t>4/13/2017</a:t>
             </a:fld>
             <a:endParaRPr lang="en-US"/>
           </a:p>
@@ -2998,83 +3013,6 @@
           </a:p>
         </p:txBody>
       </p:sp>
-      <p:pic>
-        <p:nvPicPr>
-          <p:cNvPr id="4" name="Picture 3">
-            <a:hlinkClick r:id="rId2"/>
-          </p:cNvPr>
-          <p:cNvPicPr>
-            <a:picLocks noChangeAspect="1"/>
-          </p:cNvPicPr>
-          <p:nvPr/>
-        </p:nvPicPr>
-        <p:blipFill>
-          <a:blip r:embed="rId3">
-            <a:extLst>
-              <a:ext uri="{28A0092B-C50C-407E-A947-70E740481C1C}">
-                <a14:useLocalDpi xmlns:a14="http://schemas.microsoft.com/office/drawing/2010/main" val="0"/>
-              </a:ext>
-            </a:extLst>
-          </a:blip>
-          <a:stretch>
-            <a:fillRect/>
-          </a:stretch>
-        </p:blipFill>
-        <p:spPr>
-          <a:xfrm>
-            <a:off x="11122777" y="5694657"/>
-            <a:ext cx="862095" cy="1013824"/>
-          </a:xfrm>
-          <a:prstGeom prst="rect">
-            <a:avLst/>
-          </a:prstGeom>
-        </p:spPr>
-      </p:pic>
-      <p:sp>
-        <p:nvSpPr>
-          <p:cNvPr id="5" name="TextBox 4"/>
-          <p:cNvSpPr txBox="1"/>
-          <p:nvPr/>
-        </p:nvSpPr>
-        <p:spPr>
-          <a:xfrm>
-            <a:off x="0" y="6488668"/>
-            <a:ext cx="2839916" cy="338554"/>
-          </a:xfrm>
-          <a:prstGeom prst="rect">
-            <a:avLst/>
-          </a:prstGeom>
-          <a:noFill/>
-        </p:spPr>
-        <p:txBody>
-          <a:bodyPr wrap="square" rtlCol="0">
-            <a:spAutoFit/>
-          </a:bodyPr>
-          <a:lstStyle/>
-          <a:p>
-            <a:r>
-              <a:rPr lang="en-US" sz="1600" dirty="0">
-                <a:solidFill>
-                  <a:schemeClr val="bg1">
-                    <a:lumMod val="50000"/>
-                  </a:schemeClr>
-                </a:solidFill>
-                <a:latin typeface="Cambria" panose="02040503050406030204" pitchFamily="18" charset="0"/>
-                <a:hlinkClick r:id="rId4"/>
-              </a:rPr>
-              <a:t>PLASMA Security Modules</a:t>
-            </a:r>
-            <a:endParaRPr lang="en-US" sz="1600" dirty="0">
-              <a:solidFill>
-                <a:schemeClr val="bg1">
-                  <a:lumMod val="50000"/>
-                </a:schemeClr>
-              </a:solidFill>
-              <a:latin typeface="Cambria" panose="02040503050406030204" pitchFamily="18" charset="0"/>
-            </a:endParaRPr>
-          </a:p>
-        </p:txBody>
-      </p:sp>
     </p:spTree>
     <p:extLst>
       <p:ext uri="{BB962C8B-B14F-4D97-AF65-F5344CB8AC3E}">
@@ -3200,83 +3138,6 @@
           </a:p>
         </p:txBody>
       </p:sp>
-      <p:pic>
-        <p:nvPicPr>
-          <p:cNvPr id="5" name="Picture 4">
-            <a:hlinkClick r:id="rId2"/>
-          </p:cNvPr>
-          <p:cNvPicPr>
-            <a:picLocks noChangeAspect="1"/>
-          </p:cNvPicPr>
-          <p:nvPr/>
-        </p:nvPicPr>
-        <p:blipFill>
-          <a:blip r:embed="rId3">
-            <a:extLst>
-              <a:ext uri="{28A0092B-C50C-407E-A947-70E740481C1C}">
-                <a14:useLocalDpi xmlns:a14="http://schemas.microsoft.com/office/drawing/2010/main" val="0"/>
-              </a:ext>
-            </a:extLst>
-          </a:blip>
-          <a:stretch>
-            <a:fillRect/>
-          </a:stretch>
-        </p:blipFill>
-        <p:spPr>
-          <a:xfrm>
-            <a:off x="11084677" y="5670051"/>
-            <a:ext cx="862095" cy="1013824"/>
-          </a:xfrm>
-          <a:prstGeom prst="rect">
-            <a:avLst/>
-          </a:prstGeom>
-        </p:spPr>
-      </p:pic>
-      <p:sp>
-        <p:nvSpPr>
-          <p:cNvPr id="6" name="TextBox 5"/>
-          <p:cNvSpPr txBox="1"/>
-          <p:nvPr/>
-        </p:nvSpPr>
-        <p:spPr>
-          <a:xfrm>
-            <a:off x="0" y="6488668"/>
-            <a:ext cx="2839916" cy="338554"/>
-          </a:xfrm>
-          <a:prstGeom prst="rect">
-            <a:avLst/>
-          </a:prstGeom>
-          <a:noFill/>
-        </p:spPr>
-        <p:txBody>
-          <a:bodyPr wrap="square" rtlCol="0">
-            <a:spAutoFit/>
-          </a:bodyPr>
-          <a:lstStyle/>
-          <a:p>
-            <a:r>
-              <a:rPr lang="en-US" sz="1600" dirty="0">
-                <a:solidFill>
-                  <a:schemeClr val="bg1">
-                    <a:lumMod val="50000"/>
-                  </a:schemeClr>
-                </a:solidFill>
-                <a:latin typeface="Cambria" panose="02040503050406030204" pitchFamily="18" charset="0"/>
-                <a:hlinkClick r:id="rId4"/>
-              </a:rPr>
-              <a:t>PLASMA Security Modules</a:t>
-            </a:r>
-            <a:endParaRPr lang="en-US" sz="1600" dirty="0">
-              <a:solidFill>
-                <a:schemeClr val="bg1">
-                  <a:lumMod val="50000"/>
-                </a:schemeClr>
-              </a:solidFill>
-              <a:latin typeface="Cambria" panose="02040503050406030204" pitchFamily="18" charset="0"/>
-            </a:endParaRPr>
-          </a:p>
-        </p:txBody>
-      </p:sp>
     </p:spTree>
     <p:extLst>
       <p:ext uri="{BB962C8B-B14F-4D97-AF65-F5344CB8AC3E}">
@@ -3501,83 +3362,6 @@
           </a:p>
         </p:txBody>
       </p:sp>
-      <p:pic>
-        <p:nvPicPr>
-          <p:cNvPr id="4" name="Picture 3">
-            <a:hlinkClick r:id="rId2"/>
-          </p:cNvPr>
-          <p:cNvPicPr>
-            <a:picLocks noChangeAspect="1"/>
-          </p:cNvPicPr>
-          <p:nvPr/>
-        </p:nvPicPr>
-        <p:blipFill>
-          <a:blip r:embed="rId3">
-            <a:extLst>
-              <a:ext uri="{28A0092B-C50C-407E-A947-70E740481C1C}">
-                <a14:useLocalDpi xmlns:a14="http://schemas.microsoft.com/office/drawing/2010/main" val="0"/>
-              </a:ext>
-            </a:extLst>
-          </a:blip>
-          <a:stretch>
-            <a:fillRect/>
-          </a:stretch>
-        </p:blipFill>
-        <p:spPr>
-          <a:xfrm>
-            <a:off x="11018002" y="5670051"/>
-            <a:ext cx="862095" cy="1013824"/>
-          </a:xfrm>
-          <a:prstGeom prst="rect">
-            <a:avLst/>
-          </a:prstGeom>
-        </p:spPr>
-      </p:pic>
-      <p:sp>
-        <p:nvSpPr>
-          <p:cNvPr id="6" name="TextBox 5"/>
-          <p:cNvSpPr txBox="1"/>
-          <p:nvPr/>
-        </p:nvSpPr>
-        <p:spPr>
-          <a:xfrm>
-            <a:off x="0" y="6488668"/>
-            <a:ext cx="2839916" cy="338554"/>
-          </a:xfrm>
-          <a:prstGeom prst="rect">
-            <a:avLst/>
-          </a:prstGeom>
-          <a:noFill/>
-        </p:spPr>
-        <p:txBody>
-          <a:bodyPr wrap="square" rtlCol="0">
-            <a:spAutoFit/>
-          </a:bodyPr>
-          <a:lstStyle/>
-          <a:p>
-            <a:r>
-              <a:rPr lang="en-US" sz="1600" dirty="0">
-                <a:solidFill>
-                  <a:schemeClr val="bg1">
-                    <a:lumMod val="50000"/>
-                  </a:schemeClr>
-                </a:solidFill>
-                <a:latin typeface="Cambria" panose="02040503050406030204" pitchFamily="18" charset="0"/>
-                <a:hlinkClick r:id="rId4"/>
-              </a:rPr>
-              <a:t>PLASMA Security Modules</a:t>
-            </a:r>
-            <a:endParaRPr lang="en-US" sz="1600" dirty="0">
-              <a:solidFill>
-                <a:schemeClr val="bg1">
-                  <a:lumMod val="50000"/>
-                </a:schemeClr>
-              </a:solidFill>
-              <a:latin typeface="Cambria" panose="02040503050406030204" pitchFamily="18" charset="0"/>
-            </a:endParaRPr>
-          </a:p>
-        </p:txBody>
-      </p:sp>
     </p:spTree>
     <p:extLst>
       <p:ext uri="{BB962C8B-B14F-4D97-AF65-F5344CB8AC3E}">
@@ -3765,83 +3549,6 @@
           </a:p>
         </p:txBody>
       </p:sp>
-      <p:pic>
-        <p:nvPicPr>
-          <p:cNvPr id="4" name="Picture 3">
-            <a:hlinkClick r:id="rId2"/>
-          </p:cNvPr>
-          <p:cNvPicPr>
-            <a:picLocks noChangeAspect="1"/>
-          </p:cNvPicPr>
-          <p:nvPr/>
-        </p:nvPicPr>
-        <p:blipFill>
-          <a:blip r:embed="rId3">
-            <a:extLst>
-              <a:ext uri="{28A0092B-C50C-407E-A947-70E740481C1C}">
-                <a14:useLocalDpi xmlns:a14="http://schemas.microsoft.com/office/drawing/2010/main" val="0"/>
-              </a:ext>
-            </a:extLst>
-          </a:blip>
-          <a:stretch>
-            <a:fillRect/>
-          </a:stretch>
-        </p:blipFill>
-        <p:spPr>
-          <a:xfrm>
-            <a:off x="11103727" y="5670051"/>
-            <a:ext cx="862095" cy="1013824"/>
-          </a:xfrm>
-          <a:prstGeom prst="rect">
-            <a:avLst/>
-          </a:prstGeom>
-        </p:spPr>
-      </p:pic>
-      <p:sp>
-        <p:nvSpPr>
-          <p:cNvPr id="6" name="TextBox 5"/>
-          <p:cNvSpPr txBox="1"/>
-          <p:nvPr/>
-        </p:nvSpPr>
-        <p:spPr>
-          <a:xfrm>
-            <a:off x="0" y="6488668"/>
-            <a:ext cx="2839916" cy="338554"/>
-          </a:xfrm>
-          <a:prstGeom prst="rect">
-            <a:avLst/>
-          </a:prstGeom>
-          <a:noFill/>
-        </p:spPr>
-        <p:txBody>
-          <a:bodyPr wrap="square" rtlCol="0">
-            <a:spAutoFit/>
-          </a:bodyPr>
-          <a:lstStyle/>
-          <a:p>
-            <a:r>
-              <a:rPr lang="en-US" sz="1600" dirty="0">
-                <a:solidFill>
-                  <a:schemeClr val="bg1">
-                    <a:lumMod val="50000"/>
-                  </a:schemeClr>
-                </a:solidFill>
-                <a:latin typeface="Cambria" panose="02040503050406030204" pitchFamily="18" charset="0"/>
-                <a:hlinkClick r:id="rId4"/>
-              </a:rPr>
-              <a:t>PLASMA Security Modules</a:t>
-            </a:r>
-            <a:endParaRPr lang="en-US" sz="1600" dirty="0">
-              <a:solidFill>
-                <a:schemeClr val="bg1">
-                  <a:lumMod val="50000"/>
-                </a:schemeClr>
-              </a:solidFill>
-              <a:latin typeface="Cambria" panose="02040503050406030204" pitchFamily="18" charset="0"/>
-            </a:endParaRPr>
-          </a:p>
-        </p:txBody>
-      </p:sp>
     </p:spTree>
     <p:extLst>
       <p:ext uri="{BB962C8B-B14F-4D97-AF65-F5344CB8AC3E}">
@@ -3990,83 +3697,6 @@
           </a:p>
         </p:txBody>
       </p:sp>
-      <p:pic>
-        <p:nvPicPr>
-          <p:cNvPr id="4" name="Picture 3">
-            <a:hlinkClick r:id="rId2"/>
-          </p:cNvPr>
-          <p:cNvPicPr>
-            <a:picLocks noChangeAspect="1"/>
-          </p:cNvPicPr>
-          <p:nvPr/>
-        </p:nvPicPr>
-        <p:blipFill>
-          <a:blip r:embed="rId3">
-            <a:extLst>
-              <a:ext uri="{28A0092B-C50C-407E-A947-70E740481C1C}">
-                <a14:useLocalDpi xmlns:a14="http://schemas.microsoft.com/office/drawing/2010/main" val="0"/>
-              </a:ext>
-            </a:extLst>
-          </a:blip>
-          <a:stretch>
-            <a:fillRect/>
-          </a:stretch>
-        </p:blipFill>
-        <p:spPr>
-          <a:xfrm>
-            <a:off x="11094202" y="5670051"/>
-            <a:ext cx="862095" cy="1013824"/>
-          </a:xfrm>
-          <a:prstGeom prst="rect">
-            <a:avLst/>
-          </a:prstGeom>
-        </p:spPr>
-      </p:pic>
-      <p:sp>
-        <p:nvSpPr>
-          <p:cNvPr id="6" name="TextBox 5"/>
-          <p:cNvSpPr txBox="1"/>
-          <p:nvPr/>
-        </p:nvSpPr>
-        <p:spPr>
-          <a:xfrm>
-            <a:off x="0" y="6488668"/>
-            <a:ext cx="2839916" cy="338554"/>
-          </a:xfrm>
-          <a:prstGeom prst="rect">
-            <a:avLst/>
-          </a:prstGeom>
-          <a:noFill/>
-        </p:spPr>
-        <p:txBody>
-          <a:bodyPr wrap="square" rtlCol="0">
-            <a:spAutoFit/>
-          </a:bodyPr>
-          <a:lstStyle/>
-          <a:p>
-            <a:r>
-              <a:rPr lang="en-US" sz="1600" dirty="0">
-                <a:solidFill>
-                  <a:schemeClr val="bg1">
-                    <a:lumMod val="50000"/>
-                  </a:schemeClr>
-                </a:solidFill>
-                <a:latin typeface="Cambria" panose="02040503050406030204" pitchFamily="18" charset="0"/>
-                <a:hlinkClick r:id="rId4"/>
-              </a:rPr>
-              <a:t>PLASMA Security Modules</a:t>
-            </a:r>
-            <a:endParaRPr lang="en-US" sz="1600" dirty="0">
-              <a:solidFill>
-                <a:schemeClr val="bg1">
-                  <a:lumMod val="50000"/>
-                </a:schemeClr>
-              </a:solidFill>
-              <a:latin typeface="Cambria" panose="02040503050406030204" pitchFamily="18" charset="0"/>
-            </a:endParaRPr>
-          </a:p>
-        </p:txBody>
-      </p:sp>
     </p:spTree>
     <p:extLst>
       <p:ext uri="{BB962C8B-B14F-4D97-AF65-F5344CB8AC3E}">
@@ -4258,83 +3888,6 @@
           </a:p>
         </p:txBody>
       </p:sp>
-      <p:pic>
-        <p:nvPicPr>
-          <p:cNvPr id="4" name="Picture 3">
-            <a:hlinkClick r:id="rId2"/>
-          </p:cNvPr>
-          <p:cNvPicPr>
-            <a:picLocks noChangeAspect="1"/>
-          </p:cNvPicPr>
-          <p:nvPr/>
-        </p:nvPicPr>
-        <p:blipFill>
-          <a:blip r:embed="rId3">
-            <a:extLst>
-              <a:ext uri="{28A0092B-C50C-407E-A947-70E740481C1C}">
-                <a14:useLocalDpi xmlns:a14="http://schemas.microsoft.com/office/drawing/2010/main" val="0"/>
-              </a:ext>
-            </a:extLst>
-          </a:blip>
-          <a:stretch>
-            <a:fillRect/>
-          </a:stretch>
-        </p:blipFill>
-        <p:spPr>
-          <a:xfrm>
-            <a:off x="11094202" y="5670051"/>
-            <a:ext cx="862095" cy="1013824"/>
-          </a:xfrm>
-          <a:prstGeom prst="rect">
-            <a:avLst/>
-          </a:prstGeom>
-        </p:spPr>
-      </p:pic>
-      <p:sp>
-        <p:nvSpPr>
-          <p:cNvPr id="6" name="TextBox 5"/>
-          <p:cNvSpPr txBox="1"/>
-          <p:nvPr/>
-        </p:nvSpPr>
-        <p:spPr>
-          <a:xfrm>
-            <a:off x="0" y="6488668"/>
-            <a:ext cx="2839916" cy="338554"/>
-          </a:xfrm>
-          <a:prstGeom prst="rect">
-            <a:avLst/>
-          </a:prstGeom>
-          <a:noFill/>
-        </p:spPr>
-        <p:txBody>
-          <a:bodyPr wrap="square" rtlCol="0">
-            <a:spAutoFit/>
-          </a:bodyPr>
-          <a:lstStyle/>
-          <a:p>
-            <a:r>
-              <a:rPr lang="en-US" sz="1600" dirty="0">
-                <a:solidFill>
-                  <a:schemeClr val="bg1">
-                    <a:lumMod val="50000"/>
-                  </a:schemeClr>
-                </a:solidFill>
-                <a:latin typeface="Cambria" panose="02040503050406030204" pitchFamily="18" charset="0"/>
-                <a:hlinkClick r:id="rId4"/>
-              </a:rPr>
-              <a:t>PLASMA Security Modules</a:t>
-            </a:r>
-            <a:endParaRPr lang="en-US" sz="1600" dirty="0">
-              <a:solidFill>
-                <a:schemeClr val="bg1">
-                  <a:lumMod val="50000"/>
-                </a:schemeClr>
-              </a:solidFill>
-              <a:latin typeface="Cambria" panose="02040503050406030204" pitchFamily="18" charset="0"/>
-            </a:endParaRPr>
-          </a:p>
-        </p:txBody>
-      </p:sp>
     </p:spTree>
     <p:extLst>
       <p:ext uri="{BB962C8B-B14F-4D97-AF65-F5344CB8AC3E}">
@@ -4402,7 +3955,7 @@
         <p:spPr/>
         <p:txBody>
           <a:bodyPr>
-            <a:normAutofit lnSpcReduction="10000"/>
+            <a:normAutofit/>
           </a:bodyPr>
           <a:lstStyle/>
           <a:p>
@@ -4486,83 +4039,6 @@
               </a:rPr>
               <a:t>Add permissions maybe ?</a:t>
             </a:r>
-          </a:p>
-        </p:txBody>
-      </p:sp>
-      <p:pic>
-        <p:nvPicPr>
-          <p:cNvPr id="4" name="Picture 3">
-            <a:hlinkClick r:id="rId2"/>
-          </p:cNvPr>
-          <p:cNvPicPr>
-            <a:picLocks noChangeAspect="1"/>
-          </p:cNvPicPr>
-          <p:nvPr/>
-        </p:nvPicPr>
-        <p:blipFill>
-          <a:blip r:embed="rId3">
-            <a:extLst>
-              <a:ext uri="{28A0092B-C50C-407E-A947-70E740481C1C}">
-                <a14:useLocalDpi xmlns:a14="http://schemas.microsoft.com/office/drawing/2010/main" val="0"/>
-              </a:ext>
-            </a:extLst>
-          </a:blip>
-          <a:stretch>
-            <a:fillRect/>
-          </a:stretch>
-        </p:blipFill>
-        <p:spPr>
-          <a:xfrm>
-            <a:off x="11090538" y="5670051"/>
-            <a:ext cx="862095" cy="1013824"/>
-          </a:xfrm>
-          <a:prstGeom prst="rect">
-            <a:avLst/>
-          </a:prstGeom>
-        </p:spPr>
-      </p:pic>
-      <p:sp>
-        <p:nvSpPr>
-          <p:cNvPr id="6" name="TextBox 5"/>
-          <p:cNvSpPr txBox="1"/>
-          <p:nvPr/>
-        </p:nvSpPr>
-        <p:spPr>
-          <a:xfrm>
-            <a:off x="0" y="6488668"/>
-            <a:ext cx="2839916" cy="338554"/>
-          </a:xfrm>
-          <a:prstGeom prst="rect">
-            <a:avLst/>
-          </a:prstGeom>
-          <a:noFill/>
-        </p:spPr>
-        <p:txBody>
-          <a:bodyPr wrap="square" rtlCol="0">
-            <a:spAutoFit/>
-          </a:bodyPr>
-          <a:lstStyle/>
-          <a:p>
-            <a:r>
-              <a:rPr lang="en-US" sz="1600" dirty="0">
-                <a:solidFill>
-                  <a:schemeClr val="bg1">
-                    <a:lumMod val="50000"/>
-                  </a:schemeClr>
-                </a:solidFill>
-                <a:latin typeface="Cambria" panose="02040503050406030204" pitchFamily="18" charset="0"/>
-                <a:hlinkClick r:id="rId4"/>
-              </a:rPr>
-              <a:t>PLASMA Security Modules</a:t>
-            </a:r>
-            <a:endParaRPr lang="en-US" sz="1600" dirty="0">
-              <a:solidFill>
-                <a:schemeClr val="bg1">
-                  <a:lumMod val="50000"/>
-                </a:schemeClr>
-              </a:solidFill>
-              <a:latin typeface="Cambria" panose="02040503050406030204" pitchFamily="18" charset="0"/>
-            </a:endParaRPr>
           </a:p>
         </p:txBody>
       </p:sp>
@@ -4712,83 +4188,6 @@
               <a:t>Security Tips</a:t>
             </a:r>
             <a:endParaRPr lang="en-US" dirty="0">
-              <a:latin typeface="Cambria" panose="02040503050406030204" pitchFamily="18" charset="0"/>
-            </a:endParaRPr>
-          </a:p>
-        </p:txBody>
-      </p:sp>
-      <p:pic>
-        <p:nvPicPr>
-          <p:cNvPr id="4" name="Picture 3">
-            <a:hlinkClick r:id="rId8"/>
-          </p:cNvPr>
-          <p:cNvPicPr>
-            <a:picLocks noChangeAspect="1"/>
-          </p:cNvPicPr>
-          <p:nvPr/>
-        </p:nvPicPr>
-        <p:blipFill>
-          <a:blip r:embed="rId9">
-            <a:extLst>
-              <a:ext uri="{28A0092B-C50C-407E-A947-70E740481C1C}">
-                <a14:useLocalDpi xmlns:a14="http://schemas.microsoft.com/office/drawing/2010/main" val="0"/>
-              </a:ext>
-            </a:extLst>
-          </a:blip>
-          <a:stretch>
-            <a:fillRect/>
-          </a:stretch>
-        </p:blipFill>
-        <p:spPr>
-          <a:xfrm>
-            <a:off x="11097866" y="5670051"/>
-            <a:ext cx="862095" cy="1013824"/>
-          </a:xfrm>
-          <a:prstGeom prst="rect">
-            <a:avLst/>
-          </a:prstGeom>
-        </p:spPr>
-      </p:pic>
-      <p:sp>
-        <p:nvSpPr>
-          <p:cNvPr id="6" name="TextBox 5"/>
-          <p:cNvSpPr txBox="1"/>
-          <p:nvPr/>
-        </p:nvSpPr>
-        <p:spPr>
-          <a:xfrm>
-            <a:off x="0" y="6488668"/>
-            <a:ext cx="2839916" cy="338554"/>
-          </a:xfrm>
-          <a:prstGeom prst="rect">
-            <a:avLst/>
-          </a:prstGeom>
-          <a:noFill/>
-        </p:spPr>
-        <p:txBody>
-          <a:bodyPr wrap="square" rtlCol="0">
-            <a:spAutoFit/>
-          </a:bodyPr>
-          <a:lstStyle/>
-          <a:p>
-            <a:r>
-              <a:rPr lang="en-US" sz="1600" dirty="0">
-                <a:solidFill>
-                  <a:schemeClr val="bg1">
-                    <a:lumMod val="50000"/>
-                  </a:schemeClr>
-                </a:solidFill>
-                <a:latin typeface="Cambria" panose="02040503050406030204" pitchFamily="18" charset="0"/>
-                <a:hlinkClick r:id="rId10"/>
-              </a:rPr>
-              <a:t>PLASMA Security Modules</a:t>
-            </a:r>
-            <a:endParaRPr lang="en-US" sz="1600" dirty="0">
-              <a:solidFill>
-                <a:schemeClr val="bg1">
-                  <a:lumMod val="50000"/>
-                </a:schemeClr>
-              </a:solidFill>
               <a:latin typeface="Cambria" panose="02040503050406030204" pitchFamily="18" charset="0"/>
             </a:endParaRPr>
           </a:p>

</xml_diff>

<commit_message>
Added link to the website on the slides
</commit_message>
<xml_diff>
--- a/Vulnerabilities/Services/Services_Android.pptx
+++ b/Vulnerabilities/Services/Services_Android.pptx
@@ -248,7 +248,7 @@
           <a:p>
             <a:fld id="{4EA12992-B706-4D5F-A05F-EF6466B0DE69}" type="datetimeFigureOut">
               <a:rPr lang="en-US" smtClean="0"/>
-              <a:t>4/13/2017</a:t>
+              <a:t>4/20/2017</a:t>
             </a:fld>
             <a:endParaRPr lang="en-US"/>
           </a:p>
@@ -416,7 +416,7 @@
           <a:p>
             <a:fld id="{4EA12992-B706-4D5F-A05F-EF6466B0DE69}" type="datetimeFigureOut">
               <a:rPr lang="en-US" smtClean="0"/>
-              <a:t>4/13/2017</a:t>
+              <a:t>4/20/2017</a:t>
             </a:fld>
             <a:endParaRPr lang="en-US"/>
           </a:p>
@@ -594,7 +594,7 @@
           <a:p>
             <a:fld id="{4EA12992-B706-4D5F-A05F-EF6466B0DE69}" type="datetimeFigureOut">
               <a:rPr lang="en-US" smtClean="0"/>
-              <a:t>4/13/2017</a:t>
+              <a:t>4/20/2017</a:t>
             </a:fld>
             <a:endParaRPr lang="en-US"/>
           </a:p>
@@ -825,6 +825,50 @@
           </a:p>
         </p:txBody>
       </p:sp>
+      <p:sp>
+        <p:nvSpPr>
+          <p:cNvPr id="6" name="Rectangle 5"/>
+          <p:cNvSpPr/>
+          <p:nvPr userDrawn="1"/>
+        </p:nvSpPr>
+        <p:spPr>
+          <a:xfrm>
+            <a:off x="9015105" y="26571"/>
+            <a:ext cx="3176895" cy="338554"/>
+          </a:xfrm>
+          <a:prstGeom prst="rect">
+            <a:avLst/>
+          </a:prstGeom>
+        </p:spPr>
+        <p:txBody>
+          <a:bodyPr wrap="none">
+            <a:spAutoFit/>
+          </a:bodyPr>
+          <a:lstStyle/>
+          <a:p>
+            <a:r>
+              <a:rPr lang="en-US" sz="1600" b="0" i="0" dirty="0">
+                <a:solidFill>
+                  <a:schemeClr val="bg2">
+                    <a:lumMod val="75000"/>
+                  </a:schemeClr>
+                </a:solidFill>
+                <a:latin typeface="Cambria" panose="02040503050406030204" pitchFamily="18" charset="0"/>
+                <a:hlinkClick r:id="rId4"/>
+              </a:rPr>
+              <a:t>www.Teachingmobilesecurity.com</a:t>
+            </a:r>
+            <a:endParaRPr lang="en-US" sz="1600" b="0" i="0" dirty="0">
+              <a:solidFill>
+                <a:schemeClr val="bg2">
+                  <a:lumMod val="75000"/>
+                </a:schemeClr>
+              </a:solidFill>
+              <a:latin typeface="Cambria" panose="02040503050406030204" pitchFamily="18" charset="0"/>
+            </a:endParaRPr>
+          </a:p>
+        </p:txBody>
+      </p:sp>
     </p:spTree>
     <p:extLst>
       <p:ext uri="{BB962C8B-B14F-4D97-AF65-F5344CB8AC3E}">
@@ -1022,7 +1066,7 @@
           <a:p>
             <a:fld id="{4EA12992-B706-4D5F-A05F-EF6466B0DE69}" type="datetimeFigureOut">
               <a:rPr lang="en-US" smtClean="0"/>
-              <a:t>4/13/2017</a:t>
+              <a:t>4/20/2017</a:t>
             </a:fld>
             <a:endParaRPr lang="en-US"/>
           </a:p>
@@ -1251,7 +1295,7 @@
           <a:p>
             <a:fld id="{4EA12992-B706-4D5F-A05F-EF6466B0DE69}" type="datetimeFigureOut">
               <a:rPr lang="en-US" smtClean="0"/>
-              <a:t>4/13/2017</a:t>
+              <a:t>4/20/2017</a:t>
             </a:fld>
             <a:endParaRPr lang="en-US"/>
           </a:p>
@@ -1615,7 +1659,7 @@
           <a:p>
             <a:fld id="{4EA12992-B706-4D5F-A05F-EF6466B0DE69}" type="datetimeFigureOut">
               <a:rPr lang="en-US" smtClean="0"/>
-              <a:t>4/13/2017</a:t>
+              <a:t>4/20/2017</a:t>
             </a:fld>
             <a:endParaRPr lang="en-US"/>
           </a:p>
@@ -1732,7 +1776,7 @@
           <a:p>
             <a:fld id="{4EA12992-B706-4D5F-A05F-EF6466B0DE69}" type="datetimeFigureOut">
               <a:rPr lang="en-US" smtClean="0"/>
-              <a:t>4/13/2017</a:t>
+              <a:t>4/20/2017</a:t>
             </a:fld>
             <a:endParaRPr lang="en-US"/>
           </a:p>
@@ -1827,7 +1871,7 @@
           <a:p>
             <a:fld id="{4EA12992-B706-4D5F-A05F-EF6466B0DE69}" type="datetimeFigureOut">
               <a:rPr lang="en-US" smtClean="0"/>
-              <a:t>4/13/2017</a:t>
+              <a:t>4/20/2017</a:t>
             </a:fld>
             <a:endParaRPr lang="en-US"/>
           </a:p>
@@ -2102,7 +2146,7 @@
           <a:p>
             <a:fld id="{4EA12992-B706-4D5F-A05F-EF6466B0DE69}" type="datetimeFigureOut">
               <a:rPr lang="en-US" smtClean="0"/>
-              <a:t>4/13/2017</a:t>
+              <a:t>4/20/2017</a:t>
             </a:fld>
             <a:endParaRPr lang="en-US"/>
           </a:p>
@@ -2354,7 +2398,7 @@
           <a:p>
             <a:fld id="{4EA12992-B706-4D5F-A05F-EF6466B0DE69}" type="datetimeFigureOut">
               <a:rPr lang="en-US" smtClean="0"/>
-              <a:t>4/13/2017</a:t>
+              <a:t>4/20/2017</a:t>
             </a:fld>
             <a:endParaRPr lang="en-US"/>
           </a:p>
@@ -2565,7 +2609,7 @@
           <a:p>
             <a:fld id="{4EA12992-B706-4D5F-A05F-EF6466B0DE69}" type="datetimeFigureOut">
               <a:rPr lang="en-US" smtClean="0"/>
-              <a:t>4/13/2017</a:t>
+              <a:t>4/20/2017</a:t>
             </a:fld>
             <a:endParaRPr lang="en-US"/>
           </a:p>

</xml_diff>